<commit_message>
More helpers for packing headers.
</commit_message>
<xml_diff>
--- a/Communications/Documentation/Space_Protocols.pptx
+++ b/Communications/Documentation/Space_Protocols.pptx
@@ -265,7 +265,7 @@
           <a:p>
             <a:fld id="{584D6DDA-EE2B-EF48-9F78-9750FA687617}" type="datetimeFigureOut">
               <a:rPr lang="en-US" smtClean="0"/>
-              <a:t>9/13/23</a:t>
+              <a:t>10/2/23</a:t>
             </a:fld>
             <a:endParaRPr lang="en-US"/>
           </a:p>
@@ -463,7 +463,7 @@
           <a:p>
             <a:fld id="{584D6DDA-EE2B-EF48-9F78-9750FA687617}" type="datetimeFigureOut">
               <a:rPr lang="en-US" smtClean="0"/>
-              <a:t>9/13/23</a:t>
+              <a:t>10/2/23</a:t>
             </a:fld>
             <a:endParaRPr lang="en-US"/>
           </a:p>
@@ -671,7 +671,7 @@
           <a:p>
             <a:fld id="{584D6DDA-EE2B-EF48-9F78-9750FA687617}" type="datetimeFigureOut">
               <a:rPr lang="en-US" smtClean="0"/>
-              <a:t>9/13/23</a:t>
+              <a:t>10/2/23</a:t>
             </a:fld>
             <a:endParaRPr lang="en-US"/>
           </a:p>
@@ -869,7 +869,7 @@
           <a:p>
             <a:fld id="{584D6DDA-EE2B-EF48-9F78-9750FA687617}" type="datetimeFigureOut">
               <a:rPr lang="en-US" smtClean="0"/>
-              <a:t>9/13/23</a:t>
+              <a:t>10/2/23</a:t>
             </a:fld>
             <a:endParaRPr lang="en-US"/>
           </a:p>
@@ -1144,7 +1144,7 @@
           <a:p>
             <a:fld id="{584D6DDA-EE2B-EF48-9F78-9750FA687617}" type="datetimeFigureOut">
               <a:rPr lang="en-US" smtClean="0"/>
-              <a:t>9/13/23</a:t>
+              <a:t>10/2/23</a:t>
             </a:fld>
             <a:endParaRPr lang="en-US"/>
           </a:p>
@@ -1409,7 +1409,7 @@
           <a:p>
             <a:fld id="{584D6DDA-EE2B-EF48-9F78-9750FA687617}" type="datetimeFigureOut">
               <a:rPr lang="en-US" smtClean="0"/>
-              <a:t>9/13/23</a:t>
+              <a:t>10/2/23</a:t>
             </a:fld>
             <a:endParaRPr lang="en-US"/>
           </a:p>
@@ -1826,7 +1826,7 @@
           <a:p>
             <a:fld id="{584D6DDA-EE2B-EF48-9F78-9750FA687617}" type="datetimeFigureOut">
               <a:rPr lang="en-US" smtClean="0"/>
-              <a:t>9/13/23</a:t>
+              <a:t>10/2/23</a:t>
             </a:fld>
             <a:endParaRPr lang="en-US"/>
           </a:p>
@@ -1972,7 +1972,7 @@
           <a:p>
             <a:fld id="{584D6DDA-EE2B-EF48-9F78-9750FA687617}" type="datetimeFigureOut">
               <a:rPr lang="en-US" smtClean="0"/>
-              <a:t>9/13/23</a:t>
+              <a:t>10/2/23</a:t>
             </a:fld>
             <a:endParaRPr lang="en-US"/>
           </a:p>
@@ -2085,7 +2085,7 @@
           <a:p>
             <a:fld id="{584D6DDA-EE2B-EF48-9F78-9750FA687617}" type="datetimeFigureOut">
               <a:rPr lang="en-US" smtClean="0"/>
-              <a:t>9/13/23</a:t>
+              <a:t>10/2/23</a:t>
             </a:fld>
             <a:endParaRPr lang="en-US"/>
           </a:p>
@@ -2396,7 +2396,7 @@
           <a:p>
             <a:fld id="{584D6DDA-EE2B-EF48-9F78-9750FA687617}" type="datetimeFigureOut">
               <a:rPr lang="en-US" smtClean="0"/>
-              <a:t>9/13/23</a:t>
+              <a:t>10/2/23</a:t>
             </a:fld>
             <a:endParaRPr lang="en-US"/>
           </a:p>
@@ -2689,7 +2689,7 @@
           <a:p>
             <a:fld id="{584D6DDA-EE2B-EF48-9F78-9750FA687617}" type="datetimeFigureOut">
               <a:rPr lang="en-US" smtClean="0"/>
-              <a:t>9/13/23</a:t>
+              <a:t>10/2/23</a:t>
             </a:fld>
             <a:endParaRPr lang="en-US"/>
           </a:p>
@@ -2930,7 +2930,7 @@
           <a:p>
             <a:fld id="{584D6DDA-EE2B-EF48-9F78-9750FA687617}" type="datetimeFigureOut">
               <a:rPr lang="en-US" smtClean="0"/>
-              <a:t>9/13/23</a:t>
+              <a:t>10/2/23</a:t>
             </a:fld>
             <a:endParaRPr lang="en-US"/>
           </a:p>

</xml_diff>